<commit_message>
Project done. Only need to change powerpoint!
</commit_message>
<xml_diff>
--- a/Python Tutorial - MIAE.pptx
+++ b/Python Tutorial - MIAE.pptx
@@ -12679,6 +12679,33 @@
             </a:pPr>
             <a:r>
               <a:rPr lang="en-CA" dirty="0"/>
+              <a:t>Google collab read-only link: </a:t>
+            </a:r>
+            <a:r>
+              <a:rPr lang="en-CA" dirty="0">
+                <a:hlinkClick r:id="rId3"/>
+              </a:rPr>
+              <a:t>https://colab.research.google.com/drive/1kx5J9f_HmjNWDnj76h4_Q4EL6deMArau?usp=sharing</a:t>
+            </a:r>
+            <a:endParaRPr lang="en-CA" dirty="0"/>
+          </a:p>
+          <a:p>
+            <a:pPr marL="152400" indent="0">
+              <a:spcBef>
+                <a:spcPts val="0"/>
+              </a:spcBef>
+              <a:buNone/>
+            </a:pPr>
+            <a:endParaRPr lang="en-CA" dirty="0"/>
+          </a:p>
+          <a:p>
+            <a:pPr marL="495300" indent="-342900">
+              <a:spcBef>
+                <a:spcPts val="0"/>
+              </a:spcBef>
+            </a:pPr>
+            <a:r>
+              <a:rPr lang="en-CA" dirty="0"/>
               <a:t>Will switch to Google Collab that has all the boilerplate cell blocks with the note/documentation to explain the data analysis code.  </a:t>
             </a:r>
           </a:p>
@@ -12761,7 +12788,7 @@
         </p:nvSpPr>
         <p:spPr>
           <a:xfrm>
-            <a:off x="9406091" y="1887939"/>
+            <a:off x="9563407" y="2949823"/>
             <a:ext cx="701470" cy="609455"/>
           </a:xfrm>
           <a:prstGeom prst="star5">

</xml_diff>